<commit_message>
feat: We have a banner now & imagen folder for imaginary content (static content)
</commit_message>
<xml_diff>
--- a/icons/displays.pptx
+++ b/icons/displays.pptx
@@ -260,7 +260,7 @@
           <a:p>
             <a:fld id="{5DD73A80-97F8-45CC-A7A4-0074768FD698}" type="datetimeFigureOut">
               <a:rPr lang="de-DE" smtClean="0"/>
-              <a:t>14.06.2024</a:t>
+              <a:t>16.06.2024</a:t>
             </a:fld>
             <a:endParaRPr lang="de-DE"/>
           </a:p>
@@ -458,7 +458,7 @@
           <a:p>
             <a:fld id="{5DD73A80-97F8-45CC-A7A4-0074768FD698}" type="datetimeFigureOut">
               <a:rPr lang="de-DE" smtClean="0"/>
-              <a:t>14.06.2024</a:t>
+              <a:t>16.06.2024</a:t>
             </a:fld>
             <a:endParaRPr lang="de-DE"/>
           </a:p>
@@ -666,7 +666,7 @@
           <a:p>
             <a:fld id="{5DD73A80-97F8-45CC-A7A4-0074768FD698}" type="datetimeFigureOut">
               <a:rPr lang="de-DE" smtClean="0"/>
-              <a:t>14.06.2024</a:t>
+              <a:t>16.06.2024</a:t>
             </a:fld>
             <a:endParaRPr lang="de-DE"/>
           </a:p>
@@ -864,7 +864,7 @@
           <a:p>
             <a:fld id="{5DD73A80-97F8-45CC-A7A4-0074768FD698}" type="datetimeFigureOut">
               <a:rPr lang="de-DE" smtClean="0"/>
-              <a:t>14.06.2024</a:t>
+              <a:t>16.06.2024</a:t>
             </a:fld>
             <a:endParaRPr lang="de-DE"/>
           </a:p>
@@ -1139,7 +1139,7 @@
           <a:p>
             <a:fld id="{5DD73A80-97F8-45CC-A7A4-0074768FD698}" type="datetimeFigureOut">
               <a:rPr lang="de-DE" smtClean="0"/>
-              <a:t>14.06.2024</a:t>
+              <a:t>16.06.2024</a:t>
             </a:fld>
             <a:endParaRPr lang="de-DE"/>
           </a:p>
@@ -1404,7 +1404,7 @@
           <a:p>
             <a:fld id="{5DD73A80-97F8-45CC-A7A4-0074768FD698}" type="datetimeFigureOut">
               <a:rPr lang="de-DE" smtClean="0"/>
-              <a:t>14.06.2024</a:t>
+              <a:t>16.06.2024</a:t>
             </a:fld>
             <a:endParaRPr lang="de-DE"/>
           </a:p>
@@ -1816,7 +1816,7 @@
           <a:p>
             <a:fld id="{5DD73A80-97F8-45CC-A7A4-0074768FD698}" type="datetimeFigureOut">
               <a:rPr lang="de-DE" smtClean="0"/>
-              <a:t>14.06.2024</a:t>
+              <a:t>16.06.2024</a:t>
             </a:fld>
             <a:endParaRPr lang="de-DE"/>
           </a:p>
@@ -1957,7 +1957,7 @@
           <a:p>
             <a:fld id="{5DD73A80-97F8-45CC-A7A4-0074768FD698}" type="datetimeFigureOut">
               <a:rPr lang="de-DE" smtClean="0"/>
-              <a:t>14.06.2024</a:t>
+              <a:t>16.06.2024</a:t>
             </a:fld>
             <a:endParaRPr lang="de-DE"/>
           </a:p>
@@ -2070,7 +2070,7 @@
           <a:p>
             <a:fld id="{5DD73A80-97F8-45CC-A7A4-0074768FD698}" type="datetimeFigureOut">
               <a:rPr lang="de-DE" smtClean="0"/>
-              <a:t>14.06.2024</a:t>
+              <a:t>16.06.2024</a:t>
             </a:fld>
             <a:endParaRPr lang="de-DE"/>
           </a:p>
@@ -2381,7 +2381,7 @@
           <a:p>
             <a:fld id="{5DD73A80-97F8-45CC-A7A4-0074768FD698}" type="datetimeFigureOut">
               <a:rPr lang="de-DE" smtClean="0"/>
-              <a:t>14.06.2024</a:t>
+              <a:t>16.06.2024</a:t>
             </a:fld>
             <a:endParaRPr lang="de-DE"/>
           </a:p>
@@ -2669,7 +2669,7 @@
           <a:p>
             <a:fld id="{5DD73A80-97F8-45CC-A7A4-0074768FD698}" type="datetimeFigureOut">
               <a:rPr lang="de-DE" smtClean="0"/>
-              <a:t>14.06.2024</a:t>
+              <a:t>16.06.2024</a:t>
             </a:fld>
             <a:endParaRPr lang="de-DE"/>
           </a:p>
@@ -2910,7 +2910,7 @@
           <a:p>
             <a:fld id="{5DD73A80-97F8-45CC-A7A4-0074768FD698}" type="datetimeFigureOut">
               <a:rPr lang="de-DE" smtClean="0"/>
-              <a:t>14.06.2024</a:t>
+              <a:t>16.06.2024</a:t>
             </a:fld>
             <a:endParaRPr lang="de-DE"/>
           </a:p>
@@ -3415,7 +3415,7 @@
             <a:avLst/>
           </a:prstGeom>
           <a:solidFill>
-            <a:srgbClr val="DBDBDB"/>
+            <a:srgbClr val="D0D0D0"/>
           </a:solidFill>
           <a:ln w="76200">
             <a:solidFill>
@@ -3502,12 +3502,146 @@
           </a:p>
         </p:txBody>
       </p:sp>
+      <p:sp>
+        <p:nvSpPr>
+          <p:cNvPr id="11" name="Textfeld 10">
+            <a:extLst>
+              <a:ext uri="{FF2B5EF4-FFF2-40B4-BE49-F238E27FC236}">
+                <a16:creationId xmlns:a16="http://schemas.microsoft.com/office/drawing/2014/main" id="{6895DAB4-882A-47A9-A8B4-D9D87DAE5BB5}"/>
+              </a:ext>
+            </a:extLst>
+          </p:cNvPr>
+          <p:cNvSpPr txBox="1"/>
+          <p:nvPr/>
+        </p:nvSpPr>
+        <p:spPr>
+          <a:xfrm>
+            <a:off x="99246" y="6031283"/>
+            <a:ext cx="3794414" cy="707886"/>
+          </a:xfrm>
+          <a:prstGeom prst="rect">
+            <a:avLst/>
+          </a:prstGeom>
+          <a:noFill/>
+        </p:spPr>
+        <p:txBody>
+          <a:bodyPr wrap="square" rtlCol="0">
+            <a:spAutoFit/>
+          </a:bodyPr>
+          <a:lstStyle/>
+          <a:p>
+            <a:r>
+              <a:rPr lang="en-US" sz="4000" dirty="0">
+                <a:solidFill>
+                  <a:schemeClr val="bg1"/>
+                </a:solidFill>
+                <a:latin typeface="Segoe UI" panose="020B0502040204020203" pitchFamily="34" charset="0"/>
+                <a:cs typeface="Segoe UI" panose="020B0502040204020203" pitchFamily="34" charset="0"/>
+              </a:rPr>
+              <a:t>Displayed</a:t>
+            </a:r>
+          </a:p>
+        </p:txBody>
+      </p:sp>
+      <p:sp>
+        <p:nvSpPr>
+          <p:cNvPr id="12" name="Textfeld 11">
+            <a:extLst>
+              <a:ext uri="{FF2B5EF4-FFF2-40B4-BE49-F238E27FC236}">
+                <a16:creationId xmlns:a16="http://schemas.microsoft.com/office/drawing/2014/main" id="{980C1595-0CDD-4CD1-A9E0-6345A437E917}"/>
+              </a:ext>
+            </a:extLst>
+          </p:cNvPr>
+          <p:cNvSpPr txBox="1"/>
+          <p:nvPr/>
+        </p:nvSpPr>
+        <p:spPr>
+          <a:xfrm>
+            <a:off x="2734109" y="4190235"/>
+            <a:ext cx="3821258" cy="400110"/>
+          </a:xfrm>
+          <a:prstGeom prst="rect">
+            <a:avLst/>
+          </a:prstGeom>
+          <a:noFill/>
+        </p:spPr>
+        <p:txBody>
+          <a:bodyPr wrap="square" rtlCol="0">
+            <a:spAutoFit/>
+          </a:bodyPr>
+          <a:lstStyle/>
+          <a:p>
+            <a:r>
+              <a:rPr lang="de-DE" sz="2000" dirty="0">
+                <a:solidFill>
+                  <a:schemeClr val="tx1">
+                    <a:lumMod val="75000"/>
+                    <a:lumOff val="25000"/>
+                  </a:schemeClr>
+                </a:solidFill>
+              </a:rPr>
+              <a:t>Warte auf Server...</a:t>
+            </a:r>
+          </a:p>
+        </p:txBody>
+      </p:sp>
+      <p:sp>
+        <p:nvSpPr>
+          <p:cNvPr id="13" name="Textfeld 12">
+            <a:extLst>
+              <a:ext uri="{FF2B5EF4-FFF2-40B4-BE49-F238E27FC236}">
+                <a16:creationId xmlns:a16="http://schemas.microsoft.com/office/drawing/2014/main" id="{53B7F888-C6A4-416D-A113-D2ADE527E579}"/>
+              </a:ext>
+            </a:extLst>
+          </p:cNvPr>
+          <p:cNvSpPr txBox="1"/>
+          <p:nvPr/>
+        </p:nvSpPr>
+        <p:spPr>
+          <a:xfrm>
+            <a:off x="2734109" y="3808484"/>
+            <a:ext cx="3821258" cy="523220"/>
+          </a:xfrm>
+          <a:prstGeom prst="rect">
+            <a:avLst/>
+          </a:prstGeom>
+          <a:noFill/>
+        </p:spPr>
+        <p:txBody>
+          <a:bodyPr wrap="square" rtlCol="0">
+            <a:spAutoFit/>
+          </a:bodyPr>
+          <a:lstStyle/>
+          <a:p>
+            <a:r>
+              <a:rPr lang="de-DE" sz="2800" dirty="0"/>
+              <a:t>Waiting </a:t>
+            </a:r>
+            <a:r>
+              <a:rPr lang="de-DE" sz="2800" dirty="0" err="1"/>
+              <a:t>for</a:t>
+            </a:r>
+            <a:r>
+              <a:rPr lang="de-DE" sz="2800" dirty="0"/>
+              <a:t> </a:t>
+            </a:r>
+            <a:r>
+              <a:rPr lang="de-DE" sz="2800" dirty="0" err="1"/>
+              <a:t>server</a:t>
+            </a:r>
+            <a:r>
+              <a:rPr lang="de-DE" sz="2800" dirty="0"/>
+              <a:t>…</a:t>
+            </a:r>
+          </a:p>
+        </p:txBody>
+      </p:sp>
       <p:pic>
         <p:nvPicPr>
-          <p:cNvPr id="8" name="Grafik 7">
-            <a:extLst>
-              <a:ext uri="{FF2B5EF4-FFF2-40B4-BE49-F238E27FC236}">
-                <a16:creationId xmlns:a16="http://schemas.microsoft.com/office/drawing/2014/main" id="{67A162FF-C8EA-4256-9829-F65A32BF8A68}"/>
+          <p:cNvPr id="2" name="Grafik 1">
+            <a:extLst>
+              <a:ext uri="{FF2B5EF4-FFF2-40B4-BE49-F238E27FC236}">
+                <a16:creationId xmlns:a16="http://schemas.microsoft.com/office/drawing/2014/main" id="{52E13C49-3980-4F6C-ACD9-7A80ABDB700B}"/>
               </a:ext>
             </a:extLst>
           </p:cNvPr>
@@ -3524,14 +3658,56 @@
         </p:blipFill>
         <p:spPr>
           <a:xfrm>
-            <a:off x="2760601" y="953955"/>
-            <a:ext cx="2964097" cy="2897112"/>
+            <a:off x="2728865" y="872457"/>
+            <a:ext cx="2706383" cy="2677386"/>
           </a:xfrm>
           <a:prstGeom prst="rect">
             <a:avLst/>
           </a:prstGeom>
         </p:spPr>
       </p:pic>
+      <p:sp>
+        <p:nvSpPr>
+          <p:cNvPr id="10" name="Textfeld 9">
+            <a:extLst>
+              <a:ext uri="{FF2B5EF4-FFF2-40B4-BE49-F238E27FC236}">
+                <a16:creationId xmlns:a16="http://schemas.microsoft.com/office/drawing/2014/main" id="{2DDA2A89-72F7-4C76-B6CF-DF8C4010DBCE}"/>
+              </a:ext>
+            </a:extLst>
+          </p:cNvPr>
+          <p:cNvSpPr txBox="1"/>
+          <p:nvPr/>
+        </p:nvSpPr>
+        <p:spPr>
+          <a:xfrm>
+            <a:off x="5314951" y="1377668"/>
+            <a:ext cx="3821258" cy="523220"/>
+          </a:xfrm>
+          <a:prstGeom prst="rect">
+            <a:avLst/>
+          </a:prstGeom>
+          <a:noFill/>
+        </p:spPr>
+        <p:txBody>
+          <a:bodyPr wrap="square" rtlCol="0">
+            <a:spAutoFit/>
+          </a:bodyPr>
+          <a:lstStyle/>
+          <a:p>
+            <a:r>
+              <a:rPr lang="de-DE" sz="2800" dirty="0">
+                <a:solidFill>
+                  <a:schemeClr val="tx1">
+                    <a:lumMod val="75000"/>
+                    <a:lumOff val="25000"/>
+                  </a:schemeClr>
+                </a:solidFill>
+              </a:rPr>
+              <a:t>Kein Anzeige verfügbar </a:t>
+            </a:r>
+          </a:p>
+        </p:txBody>
+      </p:sp>
       <p:sp>
         <p:nvSpPr>
           <p:cNvPr id="9" name="Textfeld 8">
@@ -3563,182 +3739,6 @@
             <a:r>
               <a:rPr lang="en-US" sz="3600" dirty="0"/>
               <a:t>No Content available </a:t>
-            </a:r>
-          </a:p>
-        </p:txBody>
-      </p:sp>
-      <p:sp>
-        <p:nvSpPr>
-          <p:cNvPr id="10" name="Textfeld 9">
-            <a:extLst>
-              <a:ext uri="{FF2B5EF4-FFF2-40B4-BE49-F238E27FC236}">
-                <a16:creationId xmlns:a16="http://schemas.microsoft.com/office/drawing/2014/main" id="{2DDA2A89-72F7-4C76-B6CF-DF8C4010DBCE}"/>
-              </a:ext>
-            </a:extLst>
-          </p:cNvPr>
-          <p:cNvSpPr txBox="1"/>
-          <p:nvPr/>
-        </p:nvSpPr>
-        <p:spPr>
-          <a:xfrm>
-            <a:off x="5314951" y="1377668"/>
-            <a:ext cx="3821258" cy="523220"/>
-          </a:xfrm>
-          <a:prstGeom prst="rect">
-            <a:avLst/>
-          </a:prstGeom>
-          <a:noFill/>
-        </p:spPr>
-        <p:txBody>
-          <a:bodyPr wrap="square" rtlCol="0">
-            <a:spAutoFit/>
-          </a:bodyPr>
-          <a:lstStyle/>
-          <a:p>
-            <a:r>
-              <a:rPr lang="de-DE" sz="2800" dirty="0">
-                <a:solidFill>
-                  <a:schemeClr val="tx1">
-                    <a:lumMod val="75000"/>
-                    <a:lumOff val="25000"/>
-                  </a:schemeClr>
-                </a:solidFill>
-              </a:rPr>
-              <a:t>Kein Anzeige verfügbar </a:t>
-            </a:r>
-          </a:p>
-        </p:txBody>
-      </p:sp>
-      <p:sp>
-        <p:nvSpPr>
-          <p:cNvPr id="11" name="Textfeld 10">
-            <a:extLst>
-              <a:ext uri="{FF2B5EF4-FFF2-40B4-BE49-F238E27FC236}">
-                <a16:creationId xmlns:a16="http://schemas.microsoft.com/office/drawing/2014/main" id="{6895DAB4-882A-47A9-A8B4-D9D87DAE5BB5}"/>
-              </a:ext>
-            </a:extLst>
-          </p:cNvPr>
-          <p:cNvSpPr txBox="1"/>
-          <p:nvPr/>
-        </p:nvSpPr>
-        <p:spPr>
-          <a:xfrm>
-            <a:off x="99246" y="6031283"/>
-            <a:ext cx="3794414" cy="707886"/>
-          </a:xfrm>
-          <a:prstGeom prst="rect">
-            <a:avLst/>
-          </a:prstGeom>
-          <a:noFill/>
-        </p:spPr>
-        <p:txBody>
-          <a:bodyPr wrap="square" rtlCol="0">
-            <a:spAutoFit/>
-          </a:bodyPr>
-          <a:lstStyle/>
-          <a:p>
-            <a:r>
-              <a:rPr lang="en-US" sz="4000" dirty="0">
-                <a:solidFill>
-                  <a:schemeClr val="bg1"/>
-                </a:solidFill>
-                <a:latin typeface="Segoe UI" panose="020B0502040204020203" pitchFamily="34" charset="0"/>
-                <a:cs typeface="Segoe UI" panose="020B0502040204020203" pitchFamily="34" charset="0"/>
-              </a:rPr>
-              <a:t>Displayed</a:t>
-            </a:r>
-          </a:p>
-        </p:txBody>
-      </p:sp>
-      <p:sp>
-        <p:nvSpPr>
-          <p:cNvPr id="12" name="Textfeld 11">
-            <a:extLst>
-              <a:ext uri="{FF2B5EF4-FFF2-40B4-BE49-F238E27FC236}">
-                <a16:creationId xmlns:a16="http://schemas.microsoft.com/office/drawing/2014/main" id="{980C1595-0CDD-4CD1-A9E0-6345A437E917}"/>
-              </a:ext>
-            </a:extLst>
-          </p:cNvPr>
-          <p:cNvSpPr txBox="1"/>
-          <p:nvPr/>
-        </p:nvSpPr>
-        <p:spPr>
-          <a:xfrm>
-            <a:off x="2734109" y="4190235"/>
-            <a:ext cx="3821258" cy="400110"/>
-          </a:xfrm>
-          <a:prstGeom prst="rect">
-            <a:avLst/>
-          </a:prstGeom>
-          <a:noFill/>
-        </p:spPr>
-        <p:txBody>
-          <a:bodyPr wrap="square" rtlCol="0">
-            <a:spAutoFit/>
-          </a:bodyPr>
-          <a:lstStyle/>
-          <a:p>
-            <a:r>
-              <a:rPr lang="de-DE" sz="2000" dirty="0">
-                <a:solidFill>
-                  <a:schemeClr val="tx1">
-                    <a:lumMod val="75000"/>
-                    <a:lumOff val="25000"/>
-                  </a:schemeClr>
-                </a:solidFill>
-              </a:rPr>
-              <a:t>Warte auf Server...</a:t>
-            </a:r>
-          </a:p>
-        </p:txBody>
-      </p:sp>
-      <p:sp>
-        <p:nvSpPr>
-          <p:cNvPr id="13" name="Textfeld 12">
-            <a:extLst>
-              <a:ext uri="{FF2B5EF4-FFF2-40B4-BE49-F238E27FC236}">
-                <a16:creationId xmlns:a16="http://schemas.microsoft.com/office/drawing/2014/main" id="{53B7F888-C6A4-416D-A113-D2ADE527E579}"/>
-              </a:ext>
-            </a:extLst>
-          </p:cNvPr>
-          <p:cNvSpPr txBox="1"/>
-          <p:nvPr/>
-        </p:nvSpPr>
-        <p:spPr>
-          <a:xfrm>
-            <a:off x="2734109" y="3808484"/>
-            <a:ext cx="3821258" cy="523220"/>
-          </a:xfrm>
-          <a:prstGeom prst="rect">
-            <a:avLst/>
-          </a:prstGeom>
-          <a:noFill/>
-        </p:spPr>
-        <p:txBody>
-          <a:bodyPr wrap="square" rtlCol="0">
-            <a:spAutoFit/>
-          </a:bodyPr>
-          <a:lstStyle/>
-          <a:p>
-            <a:r>
-              <a:rPr lang="de-DE" sz="2800" dirty="0"/>
-              <a:t>Waiting </a:t>
-            </a:r>
-            <a:r>
-              <a:rPr lang="de-DE" sz="2800" dirty="0" err="1"/>
-              <a:t>for</a:t>
-            </a:r>
-            <a:r>
-              <a:rPr lang="de-DE" sz="2800" dirty="0"/>
-              <a:t> </a:t>
-            </a:r>
-            <a:r>
-              <a:rPr lang="de-DE" sz="2800" dirty="0" err="1"/>
-              <a:t>server</a:t>
-            </a:r>
-            <a:r>
-              <a:rPr lang="de-DE" sz="2800" dirty="0"/>
-              <a:t>…</a:t>
             </a:r>
           </a:p>
         </p:txBody>

</xml_diff>

<commit_message>
fix: wrong german grammar in splash and banner
</commit_message>
<xml_diff>
--- a/icons/displays.pptx
+++ b/icons/displays.pptx
@@ -260,7 +260,7 @@
           <a:p>
             <a:fld id="{5DD73A80-97F8-45CC-A7A4-0074768FD698}" type="datetimeFigureOut">
               <a:rPr lang="de-DE" smtClean="0"/>
-              <a:t>16.06.2024</a:t>
+              <a:t>12.07.2024</a:t>
             </a:fld>
             <a:endParaRPr lang="de-DE"/>
           </a:p>
@@ -458,7 +458,7 @@
           <a:p>
             <a:fld id="{5DD73A80-97F8-45CC-A7A4-0074768FD698}" type="datetimeFigureOut">
               <a:rPr lang="de-DE" smtClean="0"/>
-              <a:t>16.06.2024</a:t>
+              <a:t>12.07.2024</a:t>
             </a:fld>
             <a:endParaRPr lang="de-DE"/>
           </a:p>
@@ -666,7 +666,7 @@
           <a:p>
             <a:fld id="{5DD73A80-97F8-45CC-A7A4-0074768FD698}" type="datetimeFigureOut">
               <a:rPr lang="de-DE" smtClean="0"/>
-              <a:t>16.06.2024</a:t>
+              <a:t>12.07.2024</a:t>
             </a:fld>
             <a:endParaRPr lang="de-DE"/>
           </a:p>
@@ -864,7 +864,7 @@
           <a:p>
             <a:fld id="{5DD73A80-97F8-45CC-A7A4-0074768FD698}" type="datetimeFigureOut">
               <a:rPr lang="de-DE" smtClean="0"/>
-              <a:t>16.06.2024</a:t>
+              <a:t>12.07.2024</a:t>
             </a:fld>
             <a:endParaRPr lang="de-DE"/>
           </a:p>
@@ -1139,7 +1139,7 @@
           <a:p>
             <a:fld id="{5DD73A80-97F8-45CC-A7A4-0074768FD698}" type="datetimeFigureOut">
               <a:rPr lang="de-DE" smtClean="0"/>
-              <a:t>16.06.2024</a:t>
+              <a:t>12.07.2024</a:t>
             </a:fld>
             <a:endParaRPr lang="de-DE"/>
           </a:p>
@@ -1404,7 +1404,7 @@
           <a:p>
             <a:fld id="{5DD73A80-97F8-45CC-A7A4-0074768FD698}" type="datetimeFigureOut">
               <a:rPr lang="de-DE" smtClean="0"/>
-              <a:t>16.06.2024</a:t>
+              <a:t>12.07.2024</a:t>
             </a:fld>
             <a:endParaRPr lang="de-DE"/>
           </a:p>
@@ -1816,7 +1816,7 @@
           <a:p>
             <a:fld id="{5DD73A80-97F8-45CC-A7A4-0074768FD698}" type="datetimeFigureOut">
               <a:rPr lang="de-DE" smtClean="0"/>
-              <a:t>16.06.2024</a:t>
+              <a:t>12.07.2024</a:t>
             </a:fld>
             <a:endParaRPr lang="de-DE"/>
           </a:p>
@@ -1957,7 +1957,7 @@
           <a:p>
             <a:fld id="{5DD73A80-97F8-45CC-A7A4-0074768FD698}" type="datetimeFigureOut">
               <a:rPr lang="de-DE" smtClean="0"/>
-              <a:t>16.06.2024</a:t>
+              <a:t>12.07.2024</a:t>
             </a:fld>
             <a:endParaRPr lang="de-DE"/>
           </a:p>
@@ -2070,7 +2070,7 @@
           <a:p>
             <a:fld id="{5DD73A80-97F8-45CC-A7A4-0074768FD698}" type="datetimeFigureOut">
               <a:rPr lang="de-DE" smtClean="0"/>
-              <a:t>16.06.2024</a:t>
+              <a:t>12.07.2024</a:t>
             </a:fld>
             <a:endParaRPr lang="de-DE"/>
           </a:p>
@@ -2381,7 +2381,7 @@
           <a:p>
             <a:fld id="{5DD73A80-97F8-45CC-A7A4-0074768FD698}" type="datetimeFigureOut">
               <a:rPr lang="de-DE" smtClean="0"/>
-              <a:t>16.06.2024</a:t>
+              <a:t>12.07.2024</a:t>
             </a:fld>
             <a:endParaRPr lang="de-DE"/>
           </a:p>
@@ -2669,7 +2669,7 @@
           <a:p>
             <a:fld id="{5DD73A80-97F8-45CC-A7A4-0074768FD698}" type="datetimeFigureOut">
               <a:rPr lang="de-DE" smtClean="0"/>
-              <a:t>16.06.2024</a:t>
+              <a:t>12.07.2024</a:t>
             </a:fld>
             <a:endParaRPr lang="de-DE"/>
           </a:p>
@@ -2910,7 +2910,7 @@
           <a:p>
             <a:fld id="{5DD73A80-97F8-45CC-A7A4-0074768FD698}" type="datetimeFigureOut">
               <a:rPr lang="de-DE" smtClean="0"/>
-              <a:t>16.06.2024</a:t>
+              <a:t>12.07.2024</a:t>
             </a:fld>
             <a:endParaRPr lang="de-DE"/>
           </a:p>
@@ -3703,7 +3703,7 @@
                   </a:schemeClr>
                 </a:solidFill>
               </a:rPr>
-              <a:t>Kein Anzeige verfügbar </a:t>
+              <a:t>Keine Anzeige verfügbar </a:t>
             </a:r>
           </a:p>
         </p:txBody>

</xml_diff>